<commit_message>
Adding week 2 files
</commit_message>
<xml_diff>
--- a/2023-FALL/Week01.pptx
+++ b/2023-FALL/Week01.pptx
@@ -275,7 +275,7 @@
           <a:p>
             <a:fld id="{2B1919C7-6BC3-4736-AC32-A62C7B81C82C}" type="datetimeFigureOut">
               <a:rPr lang="en-US" smtClean="0"/>
-              <a:t>8/20/2023</a:t>
+              <a:t>8/23/2023</a:t>
             </a:fld>
             <a:endParaRPr lang="en-US"/>
           </a:p>
@@ -473,7 +473,7 @@
           <a:p>
             <a:fld id="{2B1919C7-6BC3-4736-AC32-A62C7B81C82C}" type="datetimeFigureOut">
               <a:rPr lang="en-US" smtClean="0"/>
-              <a:t>8/20/2023</a:t>
+              <a:t>8/23/2023</a:t>
             </a:fld>
             <a:endParaRPr lang="en-US"/>
           </a:p>
@@ -681,7 +681,7 @@
           <a:p>
             <a:fld id="{2B1919C7-6BC3-4736-AC32-A62C7B81C82C}" type="datetimeFigureOut">
               <a:rPr lang="en-US" smtClean="0"/>
-              <a:t>8/20/2023</a:t>
+              <a:t>8/23/2023</a:t>
             </a:fld>
             <a:endParaRPr lang="en-US"/>
           </a:p>
@@ -879,7 +879,7 @@
           <a:p>
             <a:fld id="{2B1919C7-6BC3-4736-AC32-A62C7B81C82C}" type="datetimeFigureOut">
               <a:rPr lang="en-US" smtClean="0"/>
-              <a:t>8/20/2023</a:t>
+              <a:t>8/23/2023</a:t>
             </a:fld>
             <a:endParaRPr lang="en-US"/>
           </a:p>
@@ -1154,7 +1154,7 @@
           <a:p>
             <a:fld id="{2B1919C7-6BC3-4736-AC32-A62C7B81C82C}" type="datetimeFigureOut">
               <a:rPr lang="en-US" smtClean="0"/>
-              <a:t>8/20/2023</a:t>
+              <a:t>8/23/2023</a:t>
             </a:fld>
             <a:endParaRPr lang="en-US"/>
           </a:p>
@@ -1419,7 +1419,7 @@
           <a:p>
             <a:fld id="{2B1919C7-6BC3-4736-AC32-A62C7B81C82C}" type="datetimeFigureOut">
               <a:rPr lang="en-US" smtClean="0"/>
-              <a:t>8/20/2023</a:t>
+              <a:t>8/23/2023</a:t>
             </a:fld>
             <a:endParaRPr lang="en-US"/>
           </a:p>
@@ -1831,7 +1831,7 @@
           <a:p>
             <a:fld id="{2B1919C7-6BC3-4736-AC32-A62C7B81C82C}" type="datetimeFigureOut">
               <a:rPr lang="en-US" smtClean="0"/>
-              <a:t>8/20/2023</a:t>
+              <a:t>8/23/2023</a:t>
             </a:fld>
             <a:endParaRPr lang="en-US"/>
           </a:p>
@@ -1972,7 +1972,7 @@
           <a:p>
             <a:fld id="{2B1919C7-6BC3-4736-AC32-A62C7B81C82C}" type="datetimeFigureOut">
               <a:rPr lang="en-US" smtClean="0"/>
-              <a:t>8/20/2023</a:t>
+              <a:t>8/23/2023</a:t>
             </a:fld>
             <a:endParaRPr lang="en-US"/>
           </a:p>
@@ -2085,7 +2085,7 @@
           <a:p>
             <a:fld id="{2B1919C7-6BC3-4736-AC32-A62C7B81C82C}" type="datetimeFigureOut">
               <a:rPr lang="en-US" smtClean="0"/>
-              <a:t>8/20/2023</a:t>
+              <a:t>8/23/2023</a:t>
             </a:fld>
             <a:endParaRPr lang="en-US"/>
           </a:p>
@@ -2396,7 +2396,7 @@
           <a:p>
             <a:fld id="{2B1919C7-6BC3-4736-AC32-A62C7B81C82C}" type="datetimeFigureOut">
               <a:rPr lang="en-US" smtClean="0"/>
-              <a:t>8/20/2023</a:t>
+              <a:t>8/23/2023</a:t>
             </a:fld>
             <a:endParaRPr lang="en-US"/>
           </a:p>
@@ -2684,7 +2684,7 @@
           <a:p>
             <a:fld id="{2B1919C7-6BC3-4736-AC32-A62C7B81C82C}" type="datetimeFigureOut">
               <a:rPr lang="en-US" smtClean="0"/>
-              <a:t>8/20/2023</a:t>
+              <a:t>8/23/2023</a:t>
             </a:fld>
             <a:endParaRPr lang="en-US"/>
           </a:p>
@@ -2925,7 +2925,7 @@
           <a:p>
             <a:fld id="{2B1919C7-6BC3-4736-AC32-A62C7B81C82C}" type="datetimeFigureOut">
               <a:rPr lang="en-US" smtClean="0"/>
-              <a:t>8/20/2023</a:t>
+              <a:t>8/23/2023</a:t>
             </a:fld>
             <a:endParaRPr lang="en-US"/>
           </a:p>
@@ -4577,10 +4577,10 @@
       </p:grpSpPr>
       <p:pic>
         <p:nvPicPr>
-          <p:cNvPr id="8" name="Picture 7">
-            <a:extLst>
-              <a:ext uri="{FF2B5EF4-FFF2-40B4-BE49-F238E27FC236}">
-                <a16:creationId xmlns:a16="http://schemas.microsoft.com/office/drawing/2014/main" id="{FA295947-B9C9-4DF9-A570-A1E0A47E11DD}"/>
+          <p:cNvPr id="6" name="Picture 5">
+            <a:extLst>
+              <a:ext uri="{FF2B5EF4-FFF2-40B4-BE49-F238E27FC236}">
+                <a16:creationId xmlns:a16="http://schemas.microsoft.com/office/drawing/2014/main" id="{6486284A-1DF7-4A12-A63F-FF7358B1B7F8}"/>
               </a:ext>
             </a:extLst>
           </p:cNvPr>
@@ -4590,13 +4590,10 @@
           <p:nvPr/>
         </p:nvPicPr>
         <p:blipFill>
-          <a:blip r:embed="rId2" cstate="print">
+          <a:blip r:embed="rId2">
             <a:extLst>
               <a:ext uri="{28A0092B-C50C-407E-A947-70E740481C1C}">
                 <a14:useLocalDpi xmlns:a14="http://schemas.microsoft.com/office/drawing/2010/main" val="0"/>
-              </a:ext>
-              <a:ext uri="{837473B0-CC2E-450A-ABE3-18F120FF3D39}">
-                <a1611:picAttrSrcUrl xmlns:a1611="http://schemas.microsoft.com/office/drawing/2016/11/main" r:id="rId3"/>
               </a:ext>
             </a:extLst>
           </a:blip>
@@ -4606,7 +4603,46 @@
         </p:blipFill>
         <p:spPr>
           <a:xfrm>
-            <a:off x="4913349" y="3552006"/>
+            <a:off x="9010876" y="3548720"/>
+            <a:ext cx="2701532" cy="3215091"/>
+          </a:xfrm>
+          <a:prstGeom prst="rect">
+            <a:avLst/>
+          </a:prstGeom>
+        </p:spPr>
+      </p:pic>
+      <p:pic>
+        <p:nvPicPr>
+          <p:cNvPr id="8" name="Picture 7">
+            <a:extLst>
+              <a:ext uri="{FF2B5EF4-FFF2-40B4-BE49-F238E27FC236}">
+                <a16:creationId xmlns:a16="http://schemas.microsoft.com/office/drawing/2014/main" id="{FA295947-B9C9-4DF9-A570-A1E0A47E11DD}"/>
+              </a:ext>
+            </a:extLst>
+          </p:cNvPr>
+          <p:cNvPicPr>
+            <a:picLocks noChangeAspect="1"/>
+          </p:cNvPicPr>
+          <p:nvPr/>
+        </p:nvPicPr>
+        <p:blipFill>
+          <a:blip r:embed="rId3" cstate="print">
+            <a:extLst>
+              <a:ext uri="{28A0092B-C50C-407E-A947-70E740481C1C}">
+                <a14:useLocalDpi xmlns:a14="http://schemas.microsoft.com/office/drawing/2010/main" val="0"/>
+              </a:ext>
+              <a:ext uri="{837473B0-CC2E-450A-ABE3-18F120FF3D39}">
+                <a1611:picAttrSrcUrl xmlns:a1611="http://schemas.microsoft.com/office/drawing/2016/11/main" r:id="rId4"/>
+              </a:ext>
+            </a:extLst>
+          </a:blip>
+          <a:stretch>
+            <a:fillRect/>
+          </a:stretch>
+        </p:blipFill>
+        <p:spPr>
+          <a:xfrm>
+            <a:off x="4913349" y="3822942"/>
             <a:ext cx="3353322" cy="2757176"/>
           </a:xfrm>
           <a:prstGeom prst="rect">
@@ -4658,7 +4694,12 @@
             <p:ph idx="1"/>
           </p:nvPr>
         </p:nvSpPr>
-        <p:spPr/>
+        <p:spPr>
+          <a:xfrm>
+            <a:off x="838200" y="1407934"/>
+            <a:ext cx="10515600" cy="4351338"/>
+          </a:xfrm>
+        </p:spPr>
         <p:txBody>
           <a:bodyPr/>
           <a:lstStyle/>
@@ -4684,6 +4725,12 @@
             <a:r>
               <a:rPr lang="en-US" dirty="0"/>
               <a:t>GDE in Machine Learning 2019</a:t>
+            </a:r>
+          </a:p>
+          <a:p>
+            <a:r>
+              <a:rPr lang="en-US" dirty="0"/>
+              <a:t>Worked at FIREHOUSE Software, Wells Fargo (QCI), Corteva, and now Microsoft.</a:t>
             </a:r>
           </a:p>
         </p:txBody>
@@ -4703,13 +4750,13 @@
           <p:nvPr/>
         </p:nvPicPr>
         <p:blipFill>
-          <a:blip r:embed="rId4" cstate="print">
+          <a:blip r:embed="rId5" cstate="print">
             <a:extLst>
               <a:ext uri="{28A0092B-C50C-407E-A947-70E740481C1C}">
                 <a14:useLocalDpi xmlns:a14="http://schemas.microsoft.com/office/drawing/2010/main" val="0"/>
               </a:ext>
               <a:ext uri="{837473B0-CC2E-450A-ABE3-18F120FF3D39}">
-                <a1611:picAttrSrcUrl xmlns:a1611="http://schemas.microsoft.com/office/drawing/2016/11/main" r:id="rId5"/>
+                <a1611:picAttrSrcUrl xmlns:a1611="http://schemas.microsoft.com/office/drawing/2016/11/main" r:id="rId6"/>
               </a:ext>
             </a:extLst>
           </a:blip>
@@ -4719,7 +4766,7 @@
         </p:blipFill>
         <p:spPr>
           <a:xfrm>
-            <a:off x="838200" y="4014937"/>
+            <a:off x="838200" y="4285873"/>
             <a:ext cx="3330944" cy="2296963"/>
           </a:xfrm>
           <a:prstGeom prst="rect">
@@ -4729,38 +4776,49 @@
       </p:pic>
       <p:pic>
         <p:nvPicPr>
-          <p:cNvPr id="6" name="Picture 5">
-            <a:extLst>
-              <a:ext uri="{FF2B5EF4-FFF2-40B4-BE49-F238E27FC236}">
-                <a16:creationId xmlns:a16="http://schemas.microsoft.com/office/drawing/2014/main" id="{6486284A-1DF7-4A12-A63F-FF7358B1B7F8}"/>
+          <p:cNvPr id="1026" name="Picture 2" descr="new-microsoft-logo-SIZED-SQUARE-300x297 - Authy">
+            <a:extLst>
+              <a:ext uri="{FF2B5EF4-FFF2-40B4-BE49-F238E27FC236}">
+                <a16:creationId xmlns:a16="http://schemas.microsoft.com/office/drawing/2014/main" id="{E79BEDE8-DC56-537A-0FD6-47803BAE6C8A}"/>
               </a:ext>
             </a:extLst>
           </p:cNvPr>
           <p:cNvPicPr>
-            <a:picLocks noChangeAspect="1"/>
+            <a:picLocks noChangeAspect="1" noChangeArrowheads="1"/>
           </p:cNvPicPr>
           <p:nvPr/>
         </p:nvPicPr>
         <p:blipFill>
-          <a:blip r:embed="rId6">
+          <a:blip r:embed="rId7">
             <a:extLst>
               <a:ext uri="{28A0092B-C50C-407E-A947-70E740481C1C}">
                 <a14:useLocalDpi xmlns:a14="http://schemas.microsoft.com/office/drawing/2010/main" val="0"/>
               </a:ext>
             </a:extLst>
           </a:blip>
+          <a:srcRect/>
           <a:stretch>
             <a:fillRect/>
           </a:stretch>
         </p:blipFill>
-        <p:spPr>
+        <p:spPr bwMode="auto">
           <a:xfrm>
-            <a:off x="9010876" y="3277784"/>
-            <a:ext cx="2701532" cy="3215091"/>
+            <a:off x="8854908" y="132947"/>
+            <a:ext cx="2857500" cy="2828925"/>
           </a:xfrm>
           <a:prstGeom prst="rect">
             <a:avLst/>
           </a:prstGeom>
+          <a:noFill/>
+          <a:extLst>
+            <a:ext uri="{909E8E84-426E-40DD-AFC4-6F175D3DCCD1}">
+              <a14:hiddenFill xmlns:a14="http://schemas.microsoft.com/office/drawing/2010/main">
+                <a:solidFill>
+                  <a:srgbClr val="FFFFFF"/>
+                </a:solidFill>
+              </a14:hiddenFill>
+            </a:ext>
+          </a:extLst>
         </p:spPr>
       </p:pic>
     </p:spTree>
@@ -5196,7 +5254,7 @@
           <a:p>
             <a:r>
               <a:rPr lang="en-US" dirty="0"/>
-              <a:t>Blackboard Overview</a:t>
+              <a:t>Canvas Overview</a:t>
             </a:r>
           </a:p>
           <a:p>
@@ -5296,7 +5354,7 @@
           <a:p>
             <a:r>
               <a:rPr lang="en-US" dirty="0"/>
-              <a:t>Blackboard Overview</a:t>
+              <a:t>Canvas Overview</a:t>
             </a:r>
           </a:p>
         </p:txBody>

</xml_diff>